<commit_message>
Update slide report 3
</commit_message>
<xml_diff>
--- a/Common/Reports/Report 3.pptx
+++ b/Common/Reports/Report 3.pptx
@@ -279,7 +279,7 @@
             <a:fld id="{EFC10EE1-B198-C942-8235-326C972CBB30}" type="datetimeFigureOut">
               <a:rPr lang="en-US" smtClean="0"/>
               <a:pPr/>
-              <a:t>02/16/2017</a:t>
+              <a:t>2/17/2017</a:t>
             </a:fld>
             <a:endParaRPr lang="en-US" dirty="0"/>
           </a:p>
@@ -2327,17 +2327,7 @@
                   <a:latin typeface="Lato Black"/>
                   <a:cs typeface="Lato Black"/>
                 </a:rPr>
-                <a:t>Report </a:t>
-              </a:r>
-              <a:r>
-                <a:rPr lang="en-US" sz="13800" b="1" dirty="0" smtClean="0">
-                  <a:solidFill>
-                    <a:schemeClr val="tx1"/>
-                  </a:solidFill>
-                  <a:latin typeface="Lato Black"/>
-                  <a:cs typeface="Lato Black"/>
-                </a:rPr>
-                <a:t>3</a:t>
+                <a:t>Report 3</a:t>
               </a:r>
               <a:endParaRPr lang="en-US" sz="13800" b="1" dirty="0" smtClean="0">
                 <a:solidFill>
@@ -3341,13 +3331,6 @@
               </a:rPr>
               <a:t> Power Logic 8-Bit Shift Register</a:t>
             </a:r>
-            <a:endParaRPr lang="en-US" dirty="0">
-              <a:solidFill>
-                <a:schemeClr val="accent6">
-                  <a:lumMod val="50000"/>
-                </a:schemeClr>
-              </a:solidFill>
-            </a:endParaRPr>
           </a:p>
         </p:txBody>
       </p:sp>
@@ -4277,8 +4260,10 @@
       </p:sp>
       <p:pic>
         <p:nvPicPr>
-          <p:cNvPr id="7" name="Picture 6" descr="E:\Downloads\CapstoneUseCases.png"/>
-          <p:cNvPicPr/>
+          <p:cNvPr id="2" name="Picture 1"/>
+          <p:cNvPicPr>
+            <a:picLocks noChangeAspect="1"/>
+          </p:cNvPicPr>
           <p:nvPr/>
         </p:nvPicPr>
         <p:blipFill>
@@ -4289,23 +4274,18 @@
               </a:ext>
             </a:extLst>
           </a:blip>
-          <a:srcRect/>
           <a:stretch>
             <a:fillRect/>
           </a:stretch>
         </p:blipFill>
-        <p:spPr bwMode="auto">
-          <a:xfrm>
-            <a:off x="5434147" y="2384515"/>
-            <a:ext cx="13297989" cy="10364833"/>
+        <p:spPr>
+          <a:xfrm>
+            <a:off x="4723389" y="2246167"/>
+            <a:ext cx="16141556" cy="10919827"/>
           </a:xfrm>
           <a:prstGeom prst="rect">
             <a:avLst/>
           </a:prstGeom>
-          <a:noFill/>
-          <a:ln>
-            <a:noFill/>
-          </a:ln>
         </p:spPr>
       </p:pic>
     </p:spTree>
@@ -4412,8 +4392,10 @@
       </p:sp>
       <p:pic>
         <p:nvPicPr>
-          <p:cNvPr id="4" name="Picture 3" descr="E:\Downloads\ManagerUseCase.png"/>
-          <p:cNvPicPr/>
+          <p:cNvPr id="2" name="Picture 1"/>
+          <p:cNvPicPr>
+            <a:picLocks noChangeAspect="1"/>
+          </p:cNvPicPr>
           <p:nvPr/>
         </p:nvPicPr>
         <p:blipFill>
@@ -4424,23 +4406,18 @@
               </a:ext>
             </a:extLst>
           </a:blip>
-          <a:srcRect/>
           <a:stretch>
             <a:fillRect/>
           </a:stretch>
         </p:blipFill>
-        <p:spPr bwMode="auto">
-          <a:xfrm>
-            <a:off x="4650377" y="2847704"/>
-            <a:ext cx="14499772" cy="9222376"/>
+        <p:spPr>
+          <a:xfrm>
+            <a:off x="3030969" y="2352241"/>
+            <a:ext cx="18720667" cy="10499584"/>
           </a:xfrm>
           <a:prstGeom prst="rect">
             <a:avLst/>
           </a:prstGeom>
-          <a:noFill/>
-          <a:ln>
-            <a:noFill/>
-          </a:ln>
         </p:spPr>
       </p:pic>
     </p:spTree>
@@ -4535,7 +4512,15 @@
                   <a:schemeClr val="accent1"/>
                 </a:solidFill>
               </a:rPr>
-              <a:t>System Overview Use Case</a:t>
+              <a:t>Administrator Use </a:t>
+            </a:r>
+            <a:r>
+              <a:rPr lang="en-US" sz="5400" b="1" dirty="0" smtClean="0">
+                <a:solidFill>
+                  <a:schemeClr val="accent1"/>
+                </a:solidFill>
+              </a:rPr>
+              <a:t>Case</a:t>
             </a:r>
             <a:endParaRPr lang="en-US" sz="5400" b="1" dirty="0">
               <a:solidFill>
@@ -4547,8 +4532,10 @@
       </p:sp>
       <p:pic>
         <p:nvPicPr>
-          <p:cNvPr id="7" name="Picture 6" descr="E:\Downloads\CapstoneUseCases.png"/>
-          <p:cNvPicPr/>
+          <p:cNvPr id="2" name="Picture 1"/>
+          <p:cNvPicPr>
+            <a:picLocks noChangeAspect="1"/>
+          </p:cNvPicPr>
           <p:nvPr/>
         </p:nvPicPr>
         <p:blipFill>
@@ -4559,23 +4546,18 @@
               </a:ext>
             </a:extLst>
           </a:blip>
-          <a:srcRect/>
           <a:stretch>
             <a:fillRect/>
           </a:stretch>
         </p:blipFill>
-        <p:spPr bwMode="auto">
-          <a:xfrm>
-            <a:off x="5434147" y="2384515"/>
-            <a:ext cx="13297989" cy="10364833"/>
+        <p:spPr>
+          <a:xfrm>
+            <a:off x="7365278" y="4570268"/>
+            <a:ext cx="11439737" cy="6263986"/>
           </a:xfrm>
           <a:prstGeom prst="rect">
             <a:avLst/>
           </a:prstGeom>
-          <a:noFill/>
-          <a:ln>
-            <a:noFill/>
-          </a:ln>
         </p:spPr>
       </p:pic>
     </p:spTree>
@@ -4670,7 +4652,31 @@
                   <a:schemeClr val="accent1"/>
                 </a:solidFill>
               </a:rPr>
-              <a:t>System Overview Use Case</a:t>
+              <a:t>End </a:t>
+            </a:r>
+            <a:r>
+              <a:rPr lang="en-US" sz="5400" b="1" dirty="0" smtClean="0">
+                <a:solidFill>
+                  <a:schemeClr val="accent1"/>
+                </a:solidFill>
+              </a:rPr>
+              <a:t>User </a:t>
+            </a:r>
+            <a:r>
+              <a:rPr lang="en-US" sz="5400" b="1" dirty="0" smtClean="0">
+                <a:solidFill>
+                  <a:schemeClr val="accent1"/>
+                </a:solidFill>
+              </a:rPr>
+              <a:t>Use </a:t>
+            </a:r>
+            <a:r>
+              <a:rPr lang="en-US" sz="5400" b="1" dirty="0" smtClean="0">
+                <a:solidFill>
+                  <a:schemeClr val="accent1"/>
+                </a:solidFill>
+              </a:rPr>
+              <a:t>Case</a:t>
             </a:r>
             <a:endParaRPr lang="en-US" sz="5400" b="1" dirty="0">
               <a:solidFill>
@@ -4682,8 +4688,10 @@
       </p:sp>
       <p:pic>
         <p:nvPicPr>
-          <p:cNvPr id="7" name="Picture 6" descr="E:\Downloads\CapstoneUseCases.png"/>
-          <p:cNvPicPr/>
+          <p:cNvPr id="2" name="Picture 1"/>
+          <p:cNvPicPr>
+            <a:picLocks noChangeAspect="1"/>
+          </p:cNvPicPr>
           <p:nvPr/>
         </p:nvPicPr>
         <p:blipFill>
@@ -4694,23 +4702,18 @@
               </a:ext>
             </a:extLst>
           </a:blip>
-          <a:srcRect/>
           <a:stretch>
             <a:fillRect/>
           </a:stretch>
         </p:blipFill>
-        <p:spPr bwMode="auto">
-          <a:xfrm>
-            <a:off x="5434147" y="2384515"/>
-            <a:ext cx="13297989" cy="10364833"/>
+        <p:spPr>
+          <a:xfrm>
+            <a:off x="5672859" y="4246416"/>
+            <a:ext cx="13653196" cy="7114309"/>
           </a:xfrm>
           <a:prstGeom prst="rect">
             <a:avLst/>
           </a:prstGeom>
-          <a:noFill/>
-          <a:ln>
-            <a:noFill/>
-          </a:ln>
         </p:spPr>
       </p:pic>
     </p:spTree>
@@ -8050,13 +8053,6 @@
               </a:rPr>
               <a:t>to construct.</a:t>
             </a:r>
-            <a:endParaRPr lang="en-US" dirty="0">
-              <a:solidFill>
-                <a:schemeClr val="accent6">
-                  <a:lumMod val="50000"/>
-                </a:schemeClr>
-              </a:solidFill>
-            </a:endParaRPr>
           </a:p>
         </p:txBody>
       </p:sp>
@@ -8739,12 +8735,6 @@
               </a:rPr>
               <a:t>Specification</a:t>
             </a:r>
-            <a:endParaRPr lang="en-US" sz="8800" b="1" dirty="0">
-              <a:solidFill>
-                <a:schemeClr val="accent2"/>
-              </a:solidFill>
-              <a:cs typeface="Lato Light"/>
-            </a:endParaRPr>
           </a:p>
         </p:txBody>
       </p:sp>
@@ -8758,11 +8748,11 @@
   <p:clrMapOvr>
     <a:masterClrMapping/>
   </p:clrMapOvr>
-  <mc:AlternateContent xmlns:mc="http://schemas.openxmlformats.org/markup-compatibility/2006">
-    <mc:Choice xmlns:p14="http://schemas.microsoft.com/office/powerpoint/2010/main" Requires="p14">
+  <mc:AlternateContent xmlns:mc="http://schemas.openxmlformats.org/markup-compatibility/2006" xmlns:p14="http://schemas.microsoft.com/office/powerpoint/2010/main">
+    <mc:Choice Requires="p14">
       <p:transition p14:dur="0"/>
     </mc:Choice>
-    <mc:Fallback>
+    <mc:Fallback xmlns="">
       <p:transition/>
     </mc:Fallback>
   </mc:AlternateContent>
@@ -9102,12 +9092,6 @@
               </a:rPr>
               <a:t>System Requirement Specification</a:t>
             </a:r>
-            <a:endParaRPr lang="en-US" sz="8800" b="1" dirty="0">
-              <a:solidFill>
-                <a:schemeClr val="accent2"/>
-              </a:solidFill>
-              <a:cs typeface="Lato Light"/>
-            </a:endParaRPr>
           </a:p>
         </p:txBody>
       </p:sp>
@@ -9121,11 +9105,11 @@
   <p:clrMapOvr>
     <a:masterClrMapping/>
   </p:clrMapOvr>
-  <mc:AlternateContent xmlns:mc="http://schemas.openxmlformats.org/markup-compatibility/2006">
-    <mc:Choice xmlns:p14="http://schemas.microsoft.com/office/powerpoint/2010/main" Requires="p14">
+  <mc:AlternateContent xmlns:mc="http://schemas.openxmlformats.org/markup-compatibility/2006" xmlns:p14="http://schemas.microsoft.com/office/powerpoint/2010/main">
+    <mc:Choice Requires="p14">
       <p:transition p14:dur="0"/>
     </mc:Choice>
-    <mc:Fallback>
+    <mc:Fallback xmlns="">
       <p:transition/>
     </mc:Fallback>
   </mc:AlternateContent>

</xml_diff>